<commit_message>
some changes to the Chapter 7.
</commit_message>
<xml_diff>
--- a/Sharpest++/Chapter 7 - Type Aliasing & Type Deduction.pptx
+++ b/Sharpest++/Chapter 7 - Type Aliasing & Type Deduction.pptx
@@ -7430,7 +7430,21 @@
                 <a:latin typeface="야놀자 야체 R" panose="02020603020101020101" pitchFamily="18" charset="-127"/>
                 <a:ea typeface="야놀자 야체 R" panose="02020603020101020101" pitchFamily="18" charset="-127"/>
               </a:rPr>
-              <a:t>위에 해당하지 않은 표현식이 </a:t>
+              <a:t>위에 </a:t>
+            </a:r>
+            <a:r>
+              <a:rPr lang="ko-KR" altLang="en-US" sz="2800">
+                <a:latin typeface="야놀자 야체 R" panose="02020603020101020101" pitchFamily="18" charset="-127"/>
+                <a:ea typeface="야놀자 야체 R" panose="02020603020101020101" pitchFamily="18" charset="-127"/>
+              </a:rPr>
+              <a:t>해당하지 않는 </a:t>
+            </a:r>
+            <a:r>
+              <a:rPr lang="ko-KR" altLang="en-US" sz="2800" dirty="0">
+                <a:latin typeface="야놀자 야체 R" panose="02020603020101020101" pitchFamily="18" charset="-127"/>
+                <a:ea typeface="야놀자 야체 R" panose="02020603020101020101" pitchFamily="18" charset="-127"/>
+              </a:rPr>
+              <a:t>표현식이 </a:t>
             </a:r>
             <a:r>
               <a:rPr lang="en-US" altLang="ko-KR" sz="2800" dirty="0" err="1">

</xml_diff>